<commit_message>
updated slides. needs one more review.
</commit_message>
<xml_diff>
--- a/AngularJS-02/AngularJS-02.pptx
+++ b/AngularJS-02/AngularJS-02.pptx
@@ -11,13 +11,13 @@
     <p:sldId id="256" r:id="rId2"/>
     <p:sldId id="262" r:id="rId3"/>
     <p:sldId id="257" r:id="rId4"/>
-    <p:sldId id="258" r:id="rId5"/>
-    <p:sldId id="267" r:id="rId6"/>
-    <p:sldId id="272" r:id="rId7"/>
-    <p:sldId id="273" r:id="rId8"/>
-    <p:sldId id="259" r:id="rId9"/>
-    <p:sldId id="268" r:id="rId10"/>
-    <p:sldId id="269" r:id="rId11"/>
+    <p:sldId id="267" r:id="rId5"/>
+    <p:sldId id="276" r:id="rId6"/>
+    <p:sldId id="278" r:id="rId7"/>
+    <p:sldId id="269" r:id="rId8"/>
+    <p:sldId id="277" r:id="rId9"/>
+    <p:sldId id="273" r:id="rId10"/>
+    <p:sldId id="279" r:id="rId11"/>
     <p:sldId id="275" r:id="rId12"/>
     <p:sldId id="274" r:id="rId13"/>
     <p:sldId id="270" r:id="rId14"/>
@@ -205,7 +205,7 @@
             <a:fld id="{5D68B289-DCC4-4E93-B74E-0ECAF4BEA273}" type="datetimeFigureOut">
               <a:rPr lang="en-US" smtClean="0"/>
               <a:pPr/>
-              <a:t>2/21/2016</a:t>
+              <a:t>3/19/2016</a:t>
             </a:fld>
             <a:endParaRPr lang="en-US"/>
           </a:p>
@@ -374,7 +374,7 @@
     </p:spTree>
     <p:extLst>
       <p:ext uri="{BB962C8B-B14F-4D97-AF65-F5344CB8AC3E}">
-        <p14:creationId xmlns="" xmlns:p14="http://schemas.microsoft.com/office/powerpoint/2010/main" val="1172062371"/>
+        <p14:creationId xmlns:p14="http://schemas.microsoft.com/office/powerpoint/2010/main" xmlns="" val="1172062371"/>
       </p:ext>
     </p:extLst>
   </p:cSld>
@@ -549,7 +549,7 @@
     </p:spTree>
     <p:extLst>
       <p:ext uri="{BB962C8B-B14F-4D97-AF65-F5344CB8AC3E}">
-        <p14:creationId xmlns="" xmlns:p14="http://schemas.microsoft.com/office/powerpoint/2010/main" val="4202158705"/>
+        <p14:creationId xmlns:p14="http://schemas.microsoft.com/office/powerpoint/2010/main" xmlns="" val="4202158705"/>
       </p:ext>
     </p:extLst>
   </p:cSld>
@@ -634,7 +634,7 @@
     </p:spTree>
     <p:extLst>
       <p:ext uri="{BB962C8B-B14F-4D97-AF65-F5344CB8AC3E}">
-        <p14:creationId xmlns="" xmlns:p14="http://schemas.microsoft.com/office/powerpoint/2010/main" val="761018188"/>
+        <p14:creationId xmlns:p14="http://schemas.microsoft.com/office/powerpoint/2010/main" xmlns="" val="761018188"/>
       </p:ext>
     </p:extLst>
   </p:cSld>
@@ -711,7 +711,7 @@
               <a:t>+</a:t>
             </a:r>
             <a:r>
-              <a:rPr lang="en-US" sz="1200" b="1" i="0" u="none" strike="noStrike" kern="1200" dirty="0" err="1" smtClean="0">
+              <a:rPr lang="en-US" sz="1200" b="1" i="0" u="none" strike="noStrike" kern="1200" dirty="0" smtClean="0">
                 <a:solidFill>
                   <a:schemeClr val="tx1"/>
                 </a:solidFill>
@@ -863,7 +863,7 @@
     </p:spTree>
     <p:extLst>
       <p:ext uri="{BB962C8B-B14F-4D97-AF65-F5344CB8AC3E}">
-        <p14:creationId xmlns="" xmlns:p14="http://schemas.microsoft.com/office/powerpoint/2010/main" val="2855059919"/>
+        <p14:creationId xmlns:p14="http://schemas.microsoft.com/office/powerpoint/2010/main" xmlns="" val="2855059919"/>
       </p:ext>
     </p:extLst>
   </p:cSld>
@@ -914,7 +914,9 @@
         </p:nvSpPr>
         <p:spPr/>
         <p:txBody>
-          <a:bodyPr/>
+          <a:bodyPr>
+            <a:normAutofit/>
+          </a:bodyPr>
           <a:lstStyle/>
           <a:p>
             <a:endParaRPr lang="en-US" dirty="0"/>
@@ -939,18 +941,13 @@
             <a:fld id="{3FAA1779-64C4-4CFB-99B1-C1FE11C03E56}" type="slidenum">
               <a:rPr lang="en-US" smtClean="0"/>
               <a:pPr/>
-              <a:t>4</a:t>
+              <a:t>5</a:t>
             </a:fld>
             <a:endParaRPr lang="en-US"/>
           </a:p>
         </p:txBody>
       </p:sp>
     </p:spTree>
-    <p:extLst>
-      <p:ext uri="{BB962C8B-B14F-4D97-AF65-F5344CB8AC3E}">
-        <p14:creationId xmlns="" xmlns:p14="http://schemas.microsoft.com/office/powerpoint/2010/main" val="1988802693"/>
-      </p:ext>
-    </p:extLst>
   </p:cSld>
   <p:clrMapOvr>
     <a:masterClrMapping/>
@@ -999,564 +996,11 @@
         </p:nvSpPr>
         <p:spPr/>
         <p:txBody>
-          <a:bodyPr/>
+          <a:bodyPr>
+            <a:normAutofit/>
+          </a:bodyPr>
           <a:lstStyle/>
           <a:p>
-            <a:r>
-              <a:rPr lang="en-US" dirty="0" smtClean="0"/>
-              <a:t>Use controllers to:</a:t>
-            </a:r>
-          </a:p>
-          <a:p>
-            <a:pPr marL="174708" indent="-174708">
-              <a:buFont typeface="Arial" panose="020B0604020202020204" pitchFamily="34" charset="0"/>
-              <a:buChar char="•"/>
-            </a:pPr>
-            <a:r>
-              <a:rPr lang="en-US" dirty="0" smtClean="0"/>
-              <a:t>Set up the initial state of the $scope object.</a:t>
-            </a:r>
-          </a:p>
-          <a:p>
-            <a:pPr marL="174708" indent="-174708">
-              <a:buFont typeface="Arial" panose="020B0604020202020204" pitchFamily="34" charset="0"/>
-              <a:buChar char="•"/>
-            </a:pPr>
-            <a:r>
-              <a:rPr lang="en-US" dirty="0" smtClean="0"/>
-              <a:t>Add behavior to the $scope object.</a:t>
-            </a:r>
-          </a:p>
-          <a:p>
-            <a:pPr defTabSz="931774">
-              <a:defRPr/>
-            </a:pPr>
-            <a:endParaRPr lang="en-US" b="1" dirty="0" smtClean="0"/>
-          </a:p>
-          <a:p>
-            <a:pPr defTabSz="931774">
-              <a:defRPr/>
-            </a:pPr>
-            <a:endParaRPr lang="en-US" b="1" dirty="0" smtClean="0"/>
-          </a:p>
-          <a:p>
-            <a:pPr defTabSz="931774">
-              <a:defRPr/>
-            </a:pPr>
-            <a:r>
-              <a:rPr lang="en-US" b="1" dirty="0" smtClean="0"/>
-              <a:t>Controllers  -&gt;</a:t>
-            </a:r>
-            <a:r>
-              <a:rPr lang="en-US" dirty="0" smtClean="0"/>
-              <a:t> </a:t>
-            </a:r>
-          </a:p>
-          <a:p>
-            <a:pPr marL="232943" indent="-232943" defTabSz="931774">
-              <a:buFontTx/>
-              <a:buAutoNum type="arabicPeriod"/>
-              <a:defRPr/>
-            </a:pPr>
-            <a:r>
-              <a:rPr lang="en-US" baseline="0" dirty="0" smtClean="0"/>
-              <a:t>Show in html page -&gt; </a:t>
-            </a:r>
-            <a:r>
-              <a:rPr lang="en-US" dirty="0"/>
-              <a:t>ng-controller="</a:t>
-            </a:r>
-            <a:r>
-              <a:rPr lang="en-US" dirty="0" err="1"/>
-              <a:t>summaryCtrl</a:t>
-            </a:r>
-            <a:r>
-              <a:rPr lang="en-US" dirty="0" smtClean="0"/>
-              <a:t> </a:t>
-            </a:r>
-            <a:r>
-              <a:rPr lang="en-US" dirty="0"/>
-              <a:t>"</a:t>
-            </a:r>
-            <a:r>
-              <a:rPr lang="en-US" dirty="0" smtClean="0"/>
-              <a:t> </a:t>
-            </a:r>
-          </a:p>
-          <a:p>
-            <a:pPr marL="232943" indent="-232943" defTabSz="931774">
-              <a:buFontTx/>
-              <a:buAutoNum type="arabicPeriod"/>
-              <a:defRPr/>
-            </a:pPr>
-            <a:r>
-              <a:rPr lang="en-US" dirty="0" smtClean="0"/>
-              <a:t>Show in app.js -&gt; </a:t>
-            </a:r>
-          </a:p>
-          <a:p>
-            <a:pPr defTabSz="931774">
-              <a:defRPr/>
-            </a:pPr>
-            <a:r>
-              <a:rPr lang="en-US" baseline="0" dirty="0" smtClean="0"/>
-              <a:t> </a:t>
-            </a:r>
-            <a:r>
-              <a:rPr lang="en-US" dirty="0" err="1" smtClean="0"/>
-              <a:t>angular.module</a:t>
-            </a:r>
-            <a:r>
-              <a:rPr lang="en-US" dirty="0" smtClean="0"/>
-              <a:t>(</a:t>
-            </a:r>
-            <a:r>
-              <a:rPr lang="en-US" dirty="0"/>
-              <a:t>"getstats"</a:t>
-            </a:r>
-            <a:r>
-              <a:rPr lang="en-US" dirty="0" smtClean="0"/>
-              <a:t>).controller(</a:t>
-            </a:r>
-            <a:r>
-              <a:rPr lang="en-US" dirty="0"/>
-              <a:t>"</a:t>
-            </a:r>
-            <a:r>
-              <a:rPr lang="en-US" dirty="0" err="1"/>
-              <a:t>summaryCtrl</a:t>
-            </a:r>
-            <a:r>
-              <a:rPr lang="en-US" dirty="0"/>
-              <a:t>"</a:t>
-            </a:r>
-            <a:r>
-              <a:rPr lang="en-US" dirty="0" smtClean="0"/>
-              <a:t>, [</a:t>
-            </a:r>
-            <a:r>
-              <a:rPr lang="en-US" dirty="0"/>
-              <a:t>"$scope"</a:t>
-            </a:r>
-            <a:r>
-              <a:rPr lang="en-US" dirty="0" smtClean="0"/>
-              <a:t>, </a:t>
-            </a:r>
-            <a:r>
-              <a:rPr lang="en-US" dirty="0"/>
-              <a:t>"$timeout"</a:t>
-            </a:r>
-            <a:r>
-              <a:rPr lang="en-US" dirty="0" smtClean="0"/>
-              <a:t>, </a:t>
-            </a:r>
-            <a:r>
-              <a:rPr lang="en-US" dirty="0"/>
-              <a:t>"$filter"</a:t>
-            </a:r>
-            <a:r>
-              <a:rPr lang="en-US" dirty="0" smtClean="0"/>
-              <a:t>, </a:t>
-            </a:r>
-            <a:r>
-              <a:rPr lang="en-US" dirty="0"/>
-              <a:t>"$</a:t>
-            </a:r>
-            <a:r>
-              <a:rPr lang="en-US" dirty="0" err="1"/>
-              <a:t>rootScope</a:t>
-            </a:r>
-            <a:r>
-              <a:rPr lang="en-US" dirty="0"/>
-              <a:t>"</a:t>
-            </a:r>
-            <a:r>
-              <a:rPr lang="en-US" dirty="0" smtClean="0"/>
-              <a:t>, </a:t>
-            </a:r>
-            <a:r>
-              <a:rPr lang="en-US" dirty="0"/>
-              <a:t>"$element"</a:t>
-            </a:r>
-            <a:r>
-              <a:rPr lang="en-US" dirty="0" smtClean="0"/>
-              <a:t>, </a:t>
-            </a:r>
-          </a:p>
-          <a:p>
-            <a:pPr defTabSz="931774">
-              <a:defRPr/>
-            </a:pPr>
-            <a:r>
-              <a:rPr lang="en-US" dirty="0"/>
-              <a:t> "</a:t>
-            </a:r>
-            <a:r>
-              <a:rPr lang="en-US" dirty="0" err="1"/>
-              <a:t>getstatsSharedService</a:t>
-            </a:r>
-            <a:r>
-              <a:rPr lang="en-US" dirty="0"/>
-              <a:t>"</a:t>
-            </a:r>
-            <a:r>
-              <a:rPr lang="en-US" dirty="0" smtClean="0"/>
-              <a:t>, </a:t>
-            </a:r>
-            <a:r>
-              <a:rPr lang="en-US" dirty="0" err="1" smtClean="0"/>
-              <a:t>summaryCtrl</a:t>
-            </a:r>
-            <a:r>
-              <a:rPr lang="en-US" dirty="0" smtClean="0"/>
-              <a:t>])    </a:t>
-            </a:r>
-          </a:p>
-          <a:p>
-            <a:pPr defTabSz="931774">
-              <a:defRPr/>
-            </a:pPr>
-            <a:endParaRPr lang="en-US" dirty="0" smtClean="0"/>
-          </a:p>
-          <a:p>
-            <a:pPr defTabSz="931774">
-              <a:defRPr/>
-            </a:pPr>
-            <a:r>
-              <a:rPr lang="en-US" b="1" dirty="0" smtClean="0"/>
-              <a:t>Scope -&gt;</a:t>
-            </a:r>
-          </a:p>
-          <a:p>
-            <a:pPr defTabSz="931774">
-              <a:defRPr/>
-            </a:pPr>
-            <a:r>
-              <a:rPr lang="en-US" dirty="0" smtClean="0"/>
-              <a:t>  $</a:t>
-            </a:r>
-            <a:r>
-              <a:rPr lang="en-US" dirty="0" err="1" smtClean="0"/>
-              <a:t>scope.totalSuccessCount</a:t>
-            </a:r>
-            <a:r>
-              <a:rPr lang="en-US" dirty="0" smtClean="0"/>
-              <a:t> </a:t>
-            </a:r>
-          </a:p>
-          <a:p>
-            <a:pPr defTabSz="931774">
-              <a:defRPr/>
-            </a:pPr>
-            <a:endParaRPr lang="en-US" dirty="0" smtClean="0"/>
-          </a:p>
-          <a:p>
-            <a:pPr defTabSz="931774">
-              <a:defRPr/>
-            </a:pPr>
-            <a:r>
-              <a:rPr lang="en-US" b="1" dirty="0" smtClean="0"/>
-              <a:t>RootScope -&gt;</a:t>
-            </a:r>
-          </a:p>
-          <a:p>
-            <a:pPr defTabSz="931774">
-              <a:defRPr/>
-            </a:pPr>
-            <a:r>
-              <a:rPr lang="en-US" dirty="0" smtClean="0"/>
-              <a:t>Scopes provide separation between the model and the view, via a mechanism for watching the model for changes.</a:t>
-            </a:r>
-          </a:p>
-          <a:p>
-            <a:pPr defTabSz="931774">
-              <a:defRPr/>
-            </a:pPr>
-            <a:r>
-              <a:rPr lang="en-US" dirty="0" smtClean="0"/>
-              <a:t>Also used to communicate between</a:t>
-            </a:r>
-            <a:r>
-              <a:rPr lang="en-US" baseline="0" dirty="0" smtClean="0"/>
-              <a:t> two controllers.</a:t>
-            </a:r>
-            <a:endParaRPr lang="en-US" dirty="0" smtClean="0"/>
-          </a:p>
-          <a:p>
-            <a:pPr defTabSz="931774">
-              <a:defRPr/>
-            </a:pPr>
-            <a:endParaRPr lang="en-US" dirty="0" smtClean="0"/>
-          </a:p>
-          <a:p>
-            <a:pPr defTabSz="931774">
-              <a:defRPr/>
-            </a:pPr>
-            <a:r>
-              <a:rPr lang="en-US" dirty="0" smtClean="0"/>
-              <a:t>publish or Broadcast</a:t>
-            </a:r>
-            <a:r>
-              <a:rPr lang="en-US" baseline="0" dirty="0" smtClean="0"/>
-              <a:t> message</a:t>
-            </a:r>
-            <a:r>
-              <a:rPr lang="en-US" dirty="0" smtClean="0"/>
-              <a:t> =&gt; $</a:t>
-            </a:r>
-            <a:r>
-              <a:rPr lang="en-US" dirty="0" err="1" smtClean="0"/>
-              <a:t>rootScope.$emit</a:t>
-            </a:r>
-            <a:r>
-              <a:rPr lang="en-US" dirty="0" smtClean="0"/>
-              <a:t>(</a:t>
-            </a:r>
-            <a:r>
-              <a:rPr lang="en-US" dirty="0"/>
-              <a:t>"</a:t>
-            </a:r>
-            <a:r>
-              <a:rPr lang="en-US" dirty="0" err="1"/>
-              <a:t>showSummaryNumbers</a:t>
-            </a:r>
-            <a:r>
-              <a:rPr lang="en-US" dirty="0"/>
-              <a:t>"</a:t>
-            </a:r>
-            <a:r>
-              <a:rPr lang="en-US" dirty="0" smtClean="0"/>
-              <a:t>, { number: </a:t>
-            </a:r>
-            <a:r>
-              <a:rPr lang="en-US" dirty="0" err="1" smtClean="0"/>
-              <a:t>distinctSuccessCount</a:t>
-            </a:r>
-            <a:r>
-              <a:rPr lang="en-US" dirty="0" smtClean="0"/>
-              <a:t> </a:t>
-            </a:r>
-          </a:p>
-          <a:p>
-            <a:pPr defTabSz="931774">
-              <a:defRPr/>
-            </a:pPr>
-            <a:r>
-              <a:rPr lang="en-US" dirty="0" smtClean="0"/>
-              <a:t>subscribe to the</a:t>
-            </a:r>
-            <a:r>
-              <a:rPr lang="en-US" baseline="0" dirty="0" smtClean="0"/>
-              <a:t> message =&gt; </a:t>
-            </a:r>
-            <a:r>
-              <a:rPr lang="en-US" dirty="0" smtClean="0"/>
-              <a:t>$</a:t>
-            </a:r>
-            <a:r>
-              <a:rPr lang="en-US" dirty="0" err="1" smtClean="0"/>
-              <a:t>rootScope.$on</a:t>
-            </a:r>
-            <a:r>
-              <a:rPr lang="en-US" dirty="0" smtClean="0"/>
-              <a:t>(</a:t>
-            </a:r>
-            <a:r>
-              <a:rPr lang="en-US" dirty="0"/>
-              <a:t>"</a:t>
-            </a:r>
-            <a:r>
-              <a:rPr lang="en-US" dirty="0" err="1"/>
-              <a:t>showSummaryNumbers</a:t>
-            </a:r>
-            <a:r>
-              <a:rPr lang="en-US" dirty="0"/>
-              <a:t>"</a:t>
-            </a:r>
-            <a:r>
-              <a:rPr lang="en-US" dirty="0" smtClean="0"/>
-              <a:t> </a:t>
-            </a:r>
-          </a:p>
-          <a:p>
-            <a:pPr defTabSz="931774">
-              <a:defRPr/>
-            </a:pPr>
-            <a:r>
-              <a:rPr lang="en-US" dirty="0" smtClean="0"/>
-              <a:t> </a:t>
-            </a:r>
-          </a:p>
-          <a:p>
-            <a:pPr defTabSz="931774">
-              <a:defRPr/>
-            </a:pPr>
-            <a:endParaRPr lang="en-US" dirty="0" smtClean="0"/>
-          </a:p>
-          <a:p>
-            <a:pPr defTabSz="931774">
-              <a:defRPr/>
-            </a:pPr>
-            <a:r>
-              <a:rPr lang="en-US" b="1" dirty="0" smtClean="0"/>
-              <a:t>Directives -&gt;</a:t>
-            </a:r>
-          </a:p>
-          <a:p>
-            <a:pPr marL="465887" indent="-465887">
-              <a:buFont typeface="Arial" panose="020B0604020202020204" pitchFamily="34" charset="0"/>
-              <a:buChar char="•"/>
-            </a:pPr>
-            <a:r>
-              <a:rPr lang="en-US" b="1" dirty="0" smtClean="0">
-                <a:solidFill>
-                  <a:schemeClr val="tx2">
-                    <a:lumMod val="60000"/>
-                    <a:lumOff val="40000"/>
-                  </a:schemeClr>
-                </a:solidFill>
-              </a:rPr>
-              <a:t>Predefined -&gt; ng-click, ng-show, ng-repeat</a:t>
-            </a:r>
-          </a:p>
-          <a:p>
-            <a:pPr marL="465887" indent="-465887">
-              <a:buFont typeface="Arial" panose="020B0604020202020204" pitchFamily="34" charset="0"/>
-              <a:buChar char="•"/>
-            </a:pPr>
-            <a:r>
-              <a:rPr lang="en-US" b="1" dirty="0" smtClean="0">
-                <a:solidFill>
-                  <a:schemeClr val="tx2">
-                    <a:lumMod val="60000"/>
-                    <a:lumOff val="40000"/>
-                  </a:schemeClr>
-                </a:solidFill>
-              </a:rPr>
-              <a:t>Custom directives -&gt;</a:t>
-            </a:r>
-            <a:r>
-              <a:rPr lang="en-US" dirty="0" smtClean="0"/>
-              <a:t> </a:t>
-            </a:r>
-            <a:r>
-              <a:rPr lang="en-US" b="1" dirty="0" smtClean="0">
-                <a:solidFill>
-                  <a:schemeClr val="tx2">
-                    <a:lumMod val="60000"/>
-                    <a:lumOff val="40000"/>
-                  </a:schemeClr>
-                </a:solidFill>
-              </a:rPr>
-              <a:t>query-Logs-Span </a:t>
-            </a:r>
-          </a:p>
-          <a:p>
-            <a:endParaRPr lang="en-US" dirty="0" smtClean="0"/>
-          </a:p>
-          <a:p>
-            <a:pPr marL="232943" indent="-232943" defTabSz="931774">
-              <a:buFont typeface="+mj-lt"/>
-              <a:buAutoNum type="arabicPeriod"/>
-              <a:defRPr/>
-            </a:pPr>
-            <a:r>
-              <a:rPr lang="en-US" baseline="0" dirty="0" smtClean="0"/>
-              <a:t>App.js =&gt;</a:t>
-            </a:r>
-          </a:p>
-          <a:p>
-            <a:pPr defTabSz="931774">
-              <a:defRPr/>
-            </a:pPr>
-            <a:r>
-              <a:rPr lang="en-US" dirty="0" smtClean="0"/>
-              <a:t>    .directive(</a:t>
-            </a:r>
-            <a:r>
-              <a:rPr lang="en-US" dirty="0"/>
-              <a:t>'</a:t>
-            </a:r>
-            <a:r>
-              <a:rPr lang="en-US" dirty="0" err="1"/>
-              <a:t>queryLogsSpan</a:t>
-            </a:r>
-            <a:r>
-              <a:rPr lang="en-US" dirty="0"/>
-              <a:t>'</a:t>
-            </a:r>
-            <a:r>
-              <a:rPr lang="en-US" dirty="0" smtClean="0"/>
-              <a:t>, </a:t>
-            </a:r>
-            <a:r>
-              <a:rPr lang="en-US" dirty="0"/>
-              <a:t>function</a:t>
-            </a:r>
-            <a:r>
-              <a:rPr lang="en-US" dirty="0" smtClean="0"/>
-              <a:t> () { </a:t>
-            </a:r>
-          </a:p>
-          <a:p>
-            <a:pPr marL="232943" indent="-232943" defTabSz="931774">
-              <a:buFont typeface="+mj-lt"/>
-              <a:buAutoNum type="arabicPeriod"/>
-              <a:defRPr/>
-            </a:pPr>
-            <a:endParaRPr lang="en-US" baseline="0" dirty="0" smtClean="0"/>
-          </a:p>
-          <a:p>
-            <a:pPr marL="232943" indent="-232943" defTabSz="931774">
-              <a:buFont typeface="+mj-lt"/>
-              <a:buAutoNum type="arabicPeriod"/>
-              <a:defRPr/>
-            </a:pPr>
-            <a:r>
-              <a:rPr lang="en-US" dirty="0" smtClean="0"/>
-              <a:t>Tables.html =&gt;</a:t>
-            </a:r>
-          </a:p>
-          <a:p>
-            <a:pPr defTabSz="931774">
-              <a:defRPr/>
-            </a:pPr>
-            <a:r>
-              <a:rPr lang="en-US" dirty="0"/>
-              <a:t>     &lt;query-Logs-Span&gt;</a:t>
-            </a:r>
-            <a:r>
-              <a:rPr lang="en-US" dirty="0" smtClean="0"/>
-              <a:t> </a:t>
-            </a:r>
-          </a:p>
-          <a:p>
-            <a:pPr defTabSz="931774">
-              <a:defRPr/>
-            </a:pPr>
-            <a:endParaRPr lang="en-US" dirty="0" smtClean="0"/>
-          </a:p>
-          <a:p>
-            <a:pPr marL="0" lvl="1" defTabSz="931774">
-              <a:defRPr/>
-            </a:pPr>
-            <a:r>
-              <a:rPr lang="en-US" dirty="0" smtClean="0"/>
-              <a:t>	(*Comment query-Logs-Span and display changes without </a:t>
-            </a:r>
-            <a:r>
-              <a:rPr lang="en-US" dirty="0" err="1" smtClean="0"/>
-              <a:t>directiives</a:t>
-            </a:r>
-            <a:r>
-              <a:rPr lang="en-US" dirty="0" smtClean="0"/>
-              <a:t>.)</a:t>
-            </a:r>
-          </a:p>
-          <a:p>
-            <a:pPr defTabSz="931774">
-              <a:defRPr/>
-            </a:pPr>
             <a:endParaRPr lang="en-US" dirty="0"/>
           </a:p>
         </p:txBody>
@@ -1579,18 +1023,13 @@
             <a:fld id="{3FAA1779-64C4-4CFB-99B1-C1FE11C03E56}" type="slidenum">
               <a:rPr lang="en-US" smtClean="0"/>
               <a:pPr/>
-              <a:t>8</a:t>
+              <a:t>6</a:t>
             </a:fld>
             <a:endParaRPr lang="en-US"/>
           </a:p>
         </p:txBody>
       </p:sp>
     </p:spTree>
-    <p:extLst>
-      <p:ext uri="{BB962C8B-B14F-4D97-AF65-F5344CB8AC3E}">
-        <p14:creationId xmlns="" xmlns:p14="http://schemas.microsoft.com/office/powerpoint/2010/main" val="2254045647"/>
-      </p:ext>
-    </p:extLst>
   </p:cSld>
   <p:clrMapOvr>
     <a:masterClrMapping/>
@@ -2388,7 +1827,7 @@
             <a:fld id="{FF96E8C7-0ADA-40C3-8D1E-BF77A6BCCE6E}" type="datetimeFigureOut">
               <a:rPr lang="en-US" smtClean="0"/>
               <a:pPr/>
-              <a:t>2/21/2016</a:t>
+              <a:t>3/19/2016</a:t>
             </a:fld>
             <a:endParaRPr lang="en-US"/>
           </a:p>
@@ -2586,7 +2025,7 @@
             <a:fld id="{FF96E8C7-0ADA-40C3-8D1E-BF77A6BCCE6E}" type="datetimeFigureOut">
               <a:rPr lang="en-US" smtClean="0"/>
               <a:pPr/>
-              <a:t>2/21/2016</a:t>
+              <a:t>3/19/2016</a:t>
             </a:fld>
             <a:endParaRPr lang="en-US"/>
           </a:p>
@@ -2773,7 +2212,7 @@
             <a:fld id="{FF96E8C7-0ADA-40C3-8D1E-BF77A6BCCE6E}" type="datetimeFigureOut">
               <a:rPr lang="en-US" smtClean="0"/>
               <a:pPr/>
-              <a:t>2/21/2016</a:t>
+              <a:t>3/19/2016</a:t>
             </a:fld>
             <a:endParaRPr lang="en-US"/>
           </a:p>
@@ -2925,7 +2364,7 @@
             <a:fld id="{FF96E8C7-0ADA-40C3-8D1E-BF77A6BCCE6E}" type="datetimeFigureOut">
               <a:rPr lang="en-US" smtClean="0"/>
               <a:pPr/>
-              <a:t>2/21/2016</a:t>
+              <a:t>3/19/2016</a:t>
             </a:fld>
             <a:endParaRPr lang="en-US"/>
           </a:p>
@@ -3182,7 +2621,7 @@
             <a:fld id="{FF96E8C7-0ADA-40C3-8D1E-BF77A6BCCE6E}" type="datetimeFigureOut">
               <a:rPr lang="en-US" smtClean="0"/>
               <a:pPr/>
-              <a:t>2/21/2016</a:t>
+              <a:t>3/19/2016</a:t>
             </a:fld>
             <a:endParaRPr lang="en-US"/>
           </a:p>
@@ -3593,7 +3032,7 @@
             <a:fld id="{FF96E8C7-0ADA-40C3-8D1E-BF77A6BCCE6E}" type="datetimeFigureOut">
               <a:rPr lang="en-US" smtClean="0"/>
               <a:pPr/>
-              <a:t>2/21/2016</a:t>
+              <a:t>3/19/2016</a:t>
             </a:fld>
             <a:endParaRPr lang="en-US"/>
           </a:p>
@@ -4041,7 +3480,7 @@
             <a:fld id="{FF96E8C7-0ADA-40C3-8D1E-BF77A6BCCE6E}" type="datetimeFigureOut">
               <a:rPr lang="en-US" smtClean="0"/>
               <a:pPr/>
-              <a:t>2/21/2016</a:t>
+              <a:t>3/19/2016</a:t>
             </a:fld>
             <a:endParaRPr lang="en-US"/>
           </a:p>
@@ -4144,7 +3583,7 @@
             <a:fld id="{FF96E8C7-0ADA-40C3-8D1E-BF77A6BCCE6E}" type="datetimeFigureOut">
               <a:rPr lang="en-US" smtClean="0"/>
               <a:pPr/>
-              <a:t>2/21/2016</a:t>
+              <a:t>3/19/2016</a:t>
             </a:fld>
             <a:endParaRPr lang="en-US"/>
           </a:p>
@@ -4267,7 +3706,7 @@
             <a:fld id="{FF96E8C7-0ADA-40C3-8D1E-BF77A6BCCE6E}" type="datetimeFigureOut">
               <a:rPr lang="en-US" smtClean="0"/>
               <a:pPr/>
-              <a:t>2/21/2016</a:t>
+              <a:t>3/19/2016</a:t>
             </a:fld>
             <a:endParaRPr lang="en-US"/>
           </a:p>
@@ -4543,7 +3982,7 @@
             <a:fld id="{FF96E8C7-0ADA-40C3-8D1E-BF77A6BCCE6E}" type="datetimeFigureOut">
               <a:rPr lang="en-US" smtClean="0"/>
               <a:pPr/>
-              <a:t>2/21/2016</a:t>
+              <a:t>3/19/2016</a:t>
             </a:fld>
             <a:endParaRPr lang="en-US"/>
           </a:p>
@@ -4750,7 +4189,7 @@
             <a:fld id="{FF96E8C7-0ADA-40C3-8D1E-BF77A6BCCE6E}" type="datetimeFigureOut">
               <a:rPr lang="en-US" smtClean="0"/>
               <a:pPr/>
-              <a:t>2/21/2016</a:t>
+              <a:t>3/19/2016</a:t>
             </a:fld>
             <a:endParaRPr lang="en-US"/>
           </a:p>
@@ -5861,7 +5300,7 @@
             <a:fld id="{FF96E8C7-0ADA-40C3-8D1E-BF77A6BCCE6E}" type="datetimeFigureOut">
               <a:rPr lang="en-US" smtClean="0"/>
               <a:pPr/>
-              <a:t>2/21/2016</a:t>
+              <a:t>3/19/2016</a:t>
             </a:fld>
             <a:endParaRPr lang="en-US"/>
           </a:p>
@@ -6281,7 +5720,7 @@
           <a:blip r:embed="rId3" cstate="print">
             <a:extLst>
               <a:ext uri="{28A0092B-C50C-407E-A947-70E740481C1C}">
-                <a14:useLocalDpi xmlns="" xmlns:a14="http://schemas.microsoft.com/office/drawing/2010/main" val="0"/>
+                <a14:useLocalDpi xmlns:a14="http://schemas.microsoft.com/office/drawing/2010/main" xmlns="" val="0"/>
               </a:ext>
             </a:extLst>
           </a:blip>
@@ -6359,7 +5798,7 @@
     </p:spTree>
     <p:extLst>
       <p:ext uri="{BB962C8B-B14F-4D97-AF65-F5344CB8AC3E}">
-        <p14:creationId xmlns="" xmlns:p14="http://schemas.microsoft.com/office/powerpoint/2010/main" val="3784168607"/>
+        <p14:creationId xmlns:p14="http://schemas.microsoft.com/office/powerpoint/2010/main" xmlns="" val="3784168607"/>
       </p:ext>
     </p:extLst>
   </p:cSld>
@@ -6761,66 +6200,57 @@
         </p:nvSpPr>
         <p:spPr/>
         <p:txBody>
+          <a:bodyPr>
+            <a:normAutofit/>
+          </a:bodyPr>
+          <a:lstStyle/>
+          <a:p>
+            <a:r>
+              <a:rPr lang="en-US" sz="3500" dirty="0" smtClean="0"/>
+              <a:t>Edit Name/Score</a:t>
+            </a:r>
+          </a:p>
+          <a:p>
+            <a:pPr lvl="1"/>
+            <a:r>
+              <a:rPr lang="en-US" sz="3500" dirty="0" smtClean="0"/>
+              <a:t>Reflect on the chart with Editing Score</a:t>
+            </a:r>
+            <a:endParaRPr lang="en-US" sz="3500" dirty="0" smtClean="0"/>
+          </a:p>
+          <a:p>
+            <a:pPr lvl="1"/>
+            <a:r>
+              <a:rPr lang="en-US" sz="3500" dirty="0" smtClean="0"/>
+              <a:t>nvd3Chart page </a:t>
+            </a:r>
+            <a:endParaRPr lang="en-US" sz="3500" dirty="0" smtClean="0"/>
+          </a:p>
+        </p:txBody>
+      </p:sp>
+      <p:sp>
+        <p:nvSpPr>
+          <p:cNvPr id="3" name="Title 2"/>
+          <p:cNvSpPr>
+            <a:spLocks noGrp="1"/>
+          </p:cNvSpPr>
+          <p:nvPr>
+            <p:ph type="title"/>
+          </p:nvPr>
+        </p:nvSpPr>
+        <p:spPr>
+          <a:xfrm>
+            <a:off x="457200" y="0"/>
+            <a:ext cx="8229600" cy="1143000"/>
+          </a:xfrm>
+        </p:spPr>
+        <p:txBody>
           <a:bodyPr/>
           <a:lstStyle/>
           <a:p>
-            <a:pPr marL="457200" indent="-457200">
-              <a:buFont typeface="Arial" panose="020B0604020202020204" pitchFamily="34" charset="0"/>
-              <a:buChar char="•"/>
-            </a:pPr>
             <a:r>
               <a:rPr lang="en-US" dirty="0" smtClean="0"/>
-              <a:t>RootScope </a:t>
-            </a:r>
-          </a:p>
-          <a:p>
-            <a:pPr marL="914400" lvl="1" indent="-457200">
-              <a:buFont typeface="Arial" panose="020B0604020202020204" pitchFamily="34" charset="0"/>
-              <a:buChar char="•"/>
-            </a:pPr>
-            <a:r>
-              <a:rPr lang="en-US" dirty="0" smtClean="0"/>
-              <a:t>Scopes provide separation between the model and the view, via a mechanism for watching the model for changes</a:t>
-            </a:r>
-            <a:r>
-              <a:rPr lang="en-US" dirty="0" smtClean="0"/>
-              <a:t>.</a:t>
-            </a:r>
-          </a:p>
-          <a:p>
-            <a:pPr marL="914400" lvl="1" indent="-457200">
-              <a:buFont typeface="Arial" panose="020B0604020202020204" pitchFamily="34" charset="0"/>
-              <a:buChar char="•"/>
-            </a:pPr>
-            <a:r>
-              <a:rPr lang="en-US" dirty="0" smtClean="0"/>
-              <a:t>Can also be used to communicate between controllers</a:t>
-            </a:r>
-            <a:endParaRPr lang="en-US" dirty="0" smtClean="0"/>
-          </a:p>
-          <a:p>
-            <a:endParaRPr lang="en-US" dirty="0"/>
-          </a:p>
-        </p:txBody>
-      </p:sp>
-      <p:sp>
-        <p:nvSpPr>
-          <p:cNvPr id="3" name="Title 2"/>
-          <p:cNvSpPr>
-            <a:spLocks noGrp="1"/>
-          </p:cNvSpPr>
-          <p:nvPr>
-            <p:ph type="title"/>
-          </p:nvPr>
-        </p:nvSpPr>
-        <p:spPr/>
-        <p:txBody>
-          <a:bodyPr/>
-          <a:lstStyle/>
-          <a:p>
-            <a:r>
-              <a:rPr lang="en-US" dirty="0" err="1" smtClean="0"/>
-              <a:t>Rootscope</a:t>
+              <a:t>Two Way Binding</a:t>
             </a:r>
             <a:endParaRPr lang="en-US" dirty="0"/>
           </a:p>
@@ -6882,22 +6312,12 @@
               <a:rPr lang="en-US" dirty="0" smtClean="0"/>
               <a:t>. </a:t>
             </a:r>
-            <a:endParaRPr lang="en-US" dirty="0" smtClean="0"/>
           </a:p>
           <a:p>
             <a:r>
               <a:rPr lang="en-US" dirty="0" smtClean="0"/>
-              <a:t>Use services </a:t>
-            </a:r>
-            <a:r>
-              <a:rPr lang="en-US" dirty="0" smtClean="0"/>
-              <a:t>to organize and share code across your app</a:t>
-            </a:r>
-            <a:r>
-              <a:rPr lang="en-US" dirty="0" smtClean="0"/>
-              <a:t>.</a:t>
-            </a:r>
-            <a:endParaRPr lang="en-US" dirty="0" smtClean="0"/>
+              <a:t>Use services to organize and share code across your app.</a:t>
+            </a:r>
           </a:p>
         </p:txBody>
       </p:sp>
@@ -6970,15 +6390,7 @@
             </a:pPr>
             <a:r>
               <a:rPr lang="en-US" dirty="0" smtClean="0"/>
-              <a:t>Today’s tutorial is available at </a:t>
-            </a:r>
-            <a:r>
-              <a:rPr lang="en-US" dirty="0" err="1" smtClean="0"/>
-              <a:t>Git</a:t>
-            </a:r>
-            <a:r>
-              <a:rPr lang="en-US" dirty="0" smtClean="0"/>
-              <a:t> under</a:t>
+              <a:t>Today’s tutorial is available at Git under</a:t>
             </a:r>
           </a:p>
           <a:p>
@@ -6996,7 +6408,7 @@
               <a:rPr lang="en-US" dirty="0" smtClean="0">
                 <a:hlinkClick r:id="rId2"/>
               </a:rPr>
-              <a:t>github.com/LockheedInnovation/Project-AngularJS</a:t>
+              <a:t>github.com/LockheedInnovation/Project-AngularJS/tree/master/AngularJS-02</a:t>
             </a:r>
             <a:endParaRPr lang="en-US" dirty="0" smtClean="0"/>
           </a:p>
@@ -7031,18 +6443,18 @@
               <a:buChar char="•"/>
             </a:pPr>
             <a:r>
-              <a:rPr lang="en-US" u="sng" dirty="0" smtClean="0">
+              <a:rPr lang="en-US" dirty="0" smtClean="0">
                 <a:hlinkClick r:id="rId3"/>
               </a:rPr>
-              <a:t>http://embed.plnkr.co/A6oBjqDwMcjMmM7qupx4</a:t>
-            </a:r>
-            <a:r>
-              <a:rPr lang="en-US" u="sng" dirty="0" smtClean="0">
+              <a:t>http://embed.plnkr.co/jPuvCW</a:t>
+            </a:r>
+            <a:r>
+              <a:rPr lang="en-US" dirty="0" smtClean="0">
                 <a:hlinkClick r:id="rId3"/>
               </a:rPr>
               <a:t>/</a:t>
             </a:r>
-            <a:endParaRPr lang="en-US" u="sng" dirty="0" smtClean="0"/>
+            <a:endParaRPr lang="en-US" dirty="0" smtClean="0"/>
           </a:p>
           <a:p>
             <a:pPr marL="457200" indent="-457200">
@@ -7052,17 +6464,6 @@
             <a:endParaRPr lang="en-US" u="sng" dirty="0" smtClean="0"/>
           </a:p>
           <a:p>
-            <a:pPr marL="457200" indent="-457200">
-              <a:buFont typeface="Arial" panose="020B0604020202020204" pitchFamily="34" charset="0"/>
-              <a:buChar char="•"/>
-            </a:pPr>
-            <a:r>
-              <a:rPr lang="en-US" u="sng" dirty="0" smtClean="0"/>
-              <a:t>Show the Real Deal now</a:t>
-            </a:r>
-            <a:endParaRPr lang="en-US" dirty="0" smtClean="0"/>
-          </a:p>
-          <a:p>
             <a:endParaRPr lang="en-US" dirty="0"/>
           </a:p>
         </p:txBody>
@@ -7083,12 +6484,8 @@
           <a:lstStyle/>
           <a:p>
             <a:r>
-              <a:rPr lang="en-US" dirty="0" err="1" smtClean="0"/>
-              <a:t>Git</a:t>
-            </a:r>
-            <a:r>
               <a:rPr lang="en-US" dirty="0" smtClean="0"/>
-              <a:t> - </a:t>
+              <a:t>Git - </a:t>
             </a:r>
             <a:r>
               <a:rPr lang="en-US" dirty="0" err="1" smtClean="0"/>
@@ -7237,12 +6634,12 @@
         <p:spPr>
           <a:xfrm>
             <a:off x="533400" y="1447800"/>
-            <a:ext cx="8001000" cy="4038600"/>
+            <a:ext cx="8001000" cy="3733800"/>
           </a:xfrm>
         </p:spPr>
         <p:txBody>
           <a:bodyPr>
-            <a:normAutofit/>
+            <a:normAutofit fontScale="92500" lnSpcReduction="20000"/>
           </a:bodyPr>
           <a:lstStyle/>
           <a:p>
@@ -7252,22 +6649,9 @@
             </a:pPr>
             <a:r>
               <a:rPr lang="en-US" dirty="0" smtClean="0"/>
-              <a:t>Introduction</a:t>
-            </a:r>
-          </a:p>
-          <a:p>
-            <a:pPr marL="914400" lvl="1" indent="-457200" algn="l">
-              <a:buFont typeface="Arial" panose="020B0604020202020204" pitchFamily="34" charset="0"/>
-              <a:buChar char="•"/>
-            </a:pPr>
-            <a:r>
-              <a:rPr lang="en-US" dirty="0" smtClean="0"/>
-              <a:t>Demo </a:t>
-            </a:r>
-            <a:r>
-              <a:rPr lang="en-US" dirty="0" smtClean="0"/>
-              <a:t>Website</a:t>
-            </a:r>
+              <a:t>Introduction - Round across the room and phone</a:t>
+            </a:r>
+            <a:endParaRPr lang="en-US" dirty="0" smtClean="0"/>
           </a:p>
           <a:p>
             <a:pPr marL="457200" indent="-457200" algn="l">
@@ -7276,13 +6660,12 @@
             </a:pPr>
             <a:r>
               <a:rPr lang="en-US" dirty="0" smtClean="0"/>
-              <a:t>Modules/ </a:t>
+              <a:t>Angular</a:t>
             </a:r>
             <a:r>
               <a:rPr lang="en-US" dirty="0" smtClean="0"/>
-              <a:t>View / Controller</a:t>
-            </a:r>
-            <a:endParaRPr lang="en-US" dirty="0" smtClean="0"/>
+              <a:t> Overview</a:t>
+            </a:r>
           </a:p>
           <a:p>
             <a:pPr marL="457200" indent="-457200" algn="l">
@@ -7291,13 +6674,8 @@
             </a:pPr>
             <a:r>
               <a:rPr lang="en-US" dirty="0" smtClean="0"/>
-              <a:t>Scope / </a:t>
-            </a:r>
-            <a:r>
-              <a:rPr lang="en-US" dirty="0" err="1" smtClean="0"/>
-              <a:t>RootScope</a:t>
-            </a:r>
-            <a:endParaRPr lang="en-US" dirty="0" smtClean="0"/>
+              <a:t>Configuration/Set up</a:t>
+            </a:r>
           </a:p>
           <a:p>
             <a:pPr marL="457200" indent="-457200" algn="l">
@@ -7306,22 +6684,9 @@
             </a:pPr>
             <a:r>
               <a:rPr lang="en-US" dirty="0" smtClean="0"/>
-              <a:t>Service </a:t>
-            </a:r>
-            <a:r>
-              <a:rPr lang="en-US" dirty="0" smtClean="0"/>
-              <a:t>(Model inside)</a:t>
-            </a:r>
-          </a:p>
-          <a:p>
-            <a:pPr marL="914400" lvl="1" indent="-457200" algn="l">
-              <a:buFont typeface="Arial" panose="020B0604020202020204" pitchFamily="34" charset="0"/>
-              <a:buChar char="•"/>
-            </a:pPr>
-            <a:r>
-              <a:rPr lang="en-US" dirty="0" smtClean="0"/>
-              <a:t>Ajax calls -  $http </a:t>
-            </a:r>
+              <a:t>Bower Package Configuration</a:t>
+            </a:r>
+            <a:endParaRPr lang="en-US" dirty="0" smtClean="0"/>
           </a:p>
           <a:p>
             <a:pPr marL="457200" indent="-457200" algn="l">
@@ -7330,27 +6695,7 @@
             </a:pPr>
             <a:r>
               <a:rPr lang="en-US" dirty="0" smtClean="0"/>
-              <a:t>Angular Directives - </a:t>
-            </a:r>
-            <a:r>
-              <a:rPr lang="en-US" dirty="0" err="1" smtClean="0"/>
-              <a:t>ng</a:t>
-            </a:r>
-            <a:r>
-              <a:rPr lang="en-US" dirty="0" smtClean="0"/>
-              <a:t>-show</a:t>
-            </a:r>
-            <a:r>
-              <a:rPr lang="en-US" dirty="0" smtClean="0"/>
-              <a:t>, </a:t>
-            </a:r>
-            <a:r>
-              <a:rPr lang="en-US" dirty="0" err="1" smtClean="0"/>
-              <a:t>ng</a:t>
-            </a:r>
-            <a:r>
-              <a:rPr lang="en-US" dirty="0" smtClean="0"/>
-              <a:t>-repeat</a:t>
+              <a:t>Angular Dependencies</a:t>
             </a:r>
           </a:p>
           <a:p>
@@ -7359,6 +6704,38 @@
               <a:buChar char="•"/>
             </a:pPr>
             <a:r>
+              <a:rPr lang="en-US" dirty="0" err="1" smtClean="0"/>
+              <a:t>Rootscope</a:t>
+            </a:r>
+            <a:endParaRPr lang="en-US" dirty="0" smtClean="0"/>
+          </a:p>
+          <a:p>
+            <a:pPr marL="457200" indent="-457200" algn="l">
+              <a:buFont typeface="Arial" panose="020B0604020202020204" pitchFamily="34" charset="0"/>
+              <a:buChar char="•"/>
+            </a:pPr>
+            <a:r>
+              <a:rPr lang="en-US" dirty="0" smtClean="0"/>
+              <a:t>Directives/Custom Directives</a:t>
+            </a:r>
+          </a:p>
+          <a:p>
+            <a:pPr marL="457200" indent="-457200" algn="l">
+              <a:buFont typeface="Arial" panose="020B0604020202020204" pitchFamily="34" charset="0"/>
+              <a:buChar char="•"/>
+            </a:pPr>
+            <a:r>
+              <a:rPr lang="en-US" dirty="0" smtClean="0"/>
+              <a:t>Charts using D3/NVD3</a:t>
+            </a:r>
+            <a:endParaRPr lang="en-US" dirty="0" smtClean="0"/>
+          </a:p>
+          <a:p>
+            <a:pPr marL="457200" indent="-457200" algn="l">
+              <a:buFont typeface="Arial" panose="020B0604020202020204" pitchFamily="34" charset="0"/>
+              <a:buChar char="•"/>
+            </a:pPr>
+            <a:r>
               <a:rPr lang="en-US" dirty="0" smtClean="0"/>
               <a:t>Show Real Deal with </a:t>
             </a:r>
@@ -7381,7 +6758,7 @@
     </p:spTree>
     <p:extLst>
       <p:ext uri="{BB962C8B-B14F-4D97-AF65-F5344CB8AC3E}">
-        <p14:creationId xmlns="" xmlns:p14="http://schemas.microsoft.com/office/powerpoint/2010/main" val="773793046"/>
+        <p14:creationId xmlns:p14="http://schemas.microsoft.com/office/powerpoint/2010/main" xmlns="" val="773793046"/>
       </p:ext>
     </p:extLst>
   </p:cSld>
@@ -7473,11 +6850,7 @@
             </a:pPr>
             <a:r>
               <a:rPr lang="en-US" sz="2800" dirty="0" smtClean="0"/>
-              <a:t>AngularJS is a javascript framework for dynamic web apps</a:t>
-            </a:r>
-            <a:r>
-              <a:rPr lang="en-US" sz="2800" dirty="0" smtClean="0"/>
-              <a:t>.</a:t>
+              <a:t>AngularJS is a javascript framework for dynamic web apps.</a:t>
             </a:r>
           </a:p>
           <a:p>
@@ -7490,20 +6863,12 @@
               <a:buChar char="•"/>
             </a:pPr>
             <a:r>
-              <a:rPr lang="en-US" sz="2800" dirty="0" err="1" smtClean="0">
-                <a:solidFill>
-                  <a:schemeClr val="tx2"/>
-                </a:solidFill>
-              </a:rPr>
-              <a:t>AngularJS</a:t>
-            </a:r>
-            <a:r>
               <a:rPr lang="en-US" sz="2800" dirty="0" smtClean="0">
                 <a:solidFill>
                   <a:schemeClr val="tx2"/>
                 </a:solidFill>
               </a:rPr>
-              <a:t> is a framework (a JavaScript library) that makes it easier to communicate between your HTML document and JavaScript.</a:t>
+              <a:t>AngularJS is a framework (a JavaScript library) that makes it easier to communicate between your HTML document and JavaScript.</a:t>
             </a:r>
           </a:p>
           <a:p>
@@ -7513,11 +6878,7 @@
             </a:pPr>
             <a:r>
               <a:rPr lang="en-US" sz="2800" dirty="0" smtClean="0"/>
-              <a:t>Data </a:t>
-            </a:r>
-            <a:r>
-              <a:rPr lang="en-US" sz="2800" dirty="0" smtClean="0"/>
-              <a:t>binding, as easy in {{}}</a:t>
+              <a:t>Data binding, as easy in {{}}</a:t>
             </a:r>
           </a:p>
           <a:p>
@@ -7601,7 +6962,7 @@
     </p:spTree>
     <p:extLst>
       <p:ext uri="{BB962C8B-B14F-4D97-AF65-F5344CB8AC3E}">
-        <p14:creationId xmlns="" xmlns:p14="http://schemas.microsoft.com/office/powerpoint/2010/main" val="3054112379"/>
+        <p14:creationId xmlns:p14="http://schemas.microsoft.com/office/powerpoint/2010/main" xmlns="" val="3054112379"/>
       </p:ext>
     </p:extLst>
   </p:cSld>
@@ -7637,104 +6998,189 @@
       </p:grpSpPr>
       <p:sp>
         <p:nvSpPr>
-          <p:cNvPr id="2" name="Title 1"/>
-          <p:cNvSpPr>
-            <a:spLocks noGrp="1"/>
-          </p:cNvSpPr>
-          <p:nvPr>
-            <p:ph type="ctrTitle"/>
-          </p:nvPr>
-        </p:nvSpPr>
-        <p:spPr>
-          <a:xfrm>
-            <a:off x="609600" y="609600"/>
-            <a:ext cx="7772400" cy="990599"/>
-          </a:xfrm>
-        </p:spPr>
+          <p:cNvPr id="2" name="Content Placeholder 1"/>
+          <p:cNvSpPr>
+            <a:spLocks noGrp="1"/>
+          </p:cNvSpPr>
+          <p:nvPr>
+            <p:ph idx="1"/>
+          </p:nvPr>
+        </p:nvSpPr>
+        <p:spPr/>
         <p:txBody>
           <a:bodyPr>
-            <a:normAutofit fontScale="90000"/>
+            <a:normAutofit fontScale="92500"/>
           </a:bodyPr>
           <a:lstStyle/>
           <a:p>
+            <a:pPr>
+              <a:buFont typeface="Arial" pitchFamily="34" charset="0"/>
+              <a:buChar char="•"/>
+            </a:pPr>
             <a:r>
               <a:rPr lang="en-US" dirty="0" smtClean="0"/>
-              <a:t>Handy Information- Javascript Developers</a:t>
-            </a:r>
+              <a:t>Simple page to display data (JSON) using</a:t>
+            </a:r>
+          </a:p>
+          <a:p>
+            <a:pPr lvl="1"/>
+            <a:r>
+              <a:rPr lang="en-US" dirty="0" smtClean="0"/>
+              <a:t>View (html template)</a:t>
+            </a:r>
+          </a:p>
+          <a:p>
+            <a:pPr lvl="1"/>
+            <a:r>
+              <a:rPr lang="en-US" dirty="0" smtClean="0"/>
+              <a:t>Controller / scope / Model / Service</a:t>
+            </a:r>
+          </a:p>
+          <a:p>
+            <a:pPr marL="365760" lvl="1" indent="-256032">
+              <a:spcBef>
+                <a:spcPts val="400"/>
+              </a:spcBef>
+              <a:buSzPct val="68000"/>
+              <a:buFont typeface="Arial" pitchFamily="34" charset="0"/>
+              <a:buChar char="•"/>
+            </a:pPr>
+            <a:r>
+              <a:rPr lang="en-US" sz="2700" dirty="0" smtClean="0"/>
+              <a:t>Directory Structure</a:t>
+            </a:r>
+          </a:p>
+          <a:p>
+            <a:pPr lvl="2">
+              <a:buFont typeface="Arial" pitchFamily="34" charset="0"/>
+              <a:buChar char="•"/>
+            </a:pPr>
+            <a:r>
+              <a:rPr lang="en-US" dirty="0" smtClean="0"/>
+              <a:t>Index.html / Home.html  / About.html (View)</a:t>
+            </a:r>
+          </a:p>
+          <a:p>
+            <a:pPr lvl="2">
+              <a:buFont typeface="Arial" pitchFamily="34" charset="0"/>
+              <a:buChar char="•"/>
+            </a:pPr>
+            <a:r>
+              <a:rPr lang="en-US" dirty="0" smtClean="0"/>
+              <a:t>App.js (Model)</a:t>
+            </a:r>
+          </a:p>
+          <a:p>
+            <a:pPr lvl="2">
+              <a:buFont typeface="Arial" pitchFamily="34" charset="0"/>
+              <a:buChar char="•"/>
+            </a:pPr>
+            <a:r>
+              <a:rPr lang="en-US" dirty="0" smtClean="0"/>
+              <a:t>Controller.js (Controllers )</a:t>
+            </a:r>
+          </a:p>
+          <a:p>
+            <a:pPr lvl="2">
+              <a:buFont typeface="Arial" pitchFamily="34" charset="0"/>
+              <a:buChar char="•"/>
+            </a:pPr>
+            <a:r>
+              <a:rPr lang="en-US" dirty="0" smtClean="0"/>
+              <a:t>Filter.js (AngularJS specific to filter data using custom filter)</a:t>
+            </a:r>
+          </a:p>
+          <a:p>
+            <a:pPr lvl="2">
+              <a:buFont typeface="Arial" pitchFamily="34" charset="0"/>
+              <a:buChar char="•"/>
+            </a:pPr>
+            <a:r>
+              <a:rPr lang="en-US" dirty="0" err="1" smtClean="0"/>
+              <a:t>User.json</a:t>
+            </a:r>
+            <a:r>
+              <a:rPr lang="en-US" dirty="0" smtClean="0"/>
+              <a:t> (Data storage)</a:t>
+            </a:r>
+          </a:p>
+          <a:p>
+            <a:pPr lvl="2">
+              <a:buFont typeface="Arial" pitchFamily="34" charset="0"/>
+              <a:buChar char="•"/>
+            </a:pPr>
+            <a:r>
+              <a:rPr lang="en-US" dirty="0" smtClean="0"/>
+              <a:t>Services.js</a:t>
+            </a:r>
+          </a:p>
+          <a:p>
+            <a:pPr lvl="2">
+              <a:buFont typeface="Arial" pitchFamily="34" charset="0"/>
+              <a:buChar char="•"/>
+            </a:pPr>
+            <a:r>
+              <a:rPr lang="en-US" dirty="0" smtClean="0"/>
+              <a:t>Directives.js</a:t>
+            </a:r>
+          </a:p>
+          <a:p>
+            <a:pPr lvl="2">
+              <a:buFont typeface="Arial" pitchFamily="34" charset="0"/>
+              <a:buChar char="•"/>
+            </a:pPr>
+            <a:r>
+              <a:rPr lang="en-US" dirty="0" smtClean="0"/>
+              <a:t>Binding Modal Dialog</a:t>
+            </a:r>
+            <a:endParaRPr lang="en-US" dirty="0" smtClean="0"/>
+          </a:p>
+          <a:p>
+            <a:pPr lvl="2">
+              <a:buFont typeface="Arial" pitchFamily="34" charset="0"/>
+              <a:buChar char="•"/>
+            </a:pPr>
+            <a:endParaRPr lang="en-US" dirty="0" smtClean="0"/>
+          </a:p>
+          <a:p>
+            <a:pPr lvl="1">
+              <a:buNone/>
+            </a:pPr>
+            <a:endParaRPr lang="en-US" dirty="0" smtClean="0"/>
+          </a:p>
+          <a:p>
+            <a:pPr lvl="1"/>
+            <a:endParaRPr lang="en-US" dirty="0" smtClean="0"/>
+          </a:p>
+          <a:p>
             <a:endParaRPr lang="en-US" dirty="0"/>
           </a:p>
         </p:txBody>
       </p:sp>
       <p:sp>
         <p:nvSpPr>
-          <p:cNvPr id="3" name="Subtitle 2"/>
-          <p:cNvSpPr>
-            <a:spLocks noGrp="1"/>
-          </p:cNvSpPr>
-          <p:nvPr>
-            <p:ph type="subTitle" idx="1"/>
-          </p:nvPr>
-        </p:nvSpPr>
-        <p:spPr>
-          <a:xfrm>
-            <a:off x="533400" y="1600200"/>
-            <a:ext cx="8001000" cy="4800600"/>
-          </a:xfrm>
-        </p:spPr>
+          <p:cNvPr id="3" name="Title 2"/>
+          <p:cNvSpPr>
+            <a:spLocks noGrp="1"/>
+          </p:cNvSpPr>
+          <p:nvPr>
+            <p:ph type="title"/>
+          </p:nvPr>
+        </p:nvSpPr>
+        <p:spPr/>
         <p:txBody>
           <a:bodyPr/>
           <a:lstStyle/>
           <a:p>
-            <a:pPr marL="457200" indent="-457200" algn="l">
-              <a:buFont typeface="Arial" panose="020B0604020202020204" pitchFamily="34" charset="0"/>
-              <a:buChar char="•"/>
-            </a:pPr>
-            <a:r>
-              <a:rPr lang="en-US" sz="3600" dirty="0" smtClean="0"/>
-              <a:t>Jsfiddle</a:t>
-            </a:r>
-          </a:p>
-          <a:p>
-            <a:pPr marL="457200" indent="-457200" algn="l">
-              <a:buFont typeface="Arial" panose="020B0604020202020204" pitchFamily="34" charset="0"/>
-              <a:buChar char="•"/>
-            </a:pPr>
-            <a:r>
-              <a:rPr lang="en-US" sz="3600" dirty="0" smtClean="0"/>
-              <a:t>Plunker</a:t>
-            </a:r>
-          </a:p>
-          <a:p>
-            <a:pPr marL="457200" indent="-457200" algn="l">
-              <a:buFont typeface="Arial" panose="020B0604020202020204" pitchFamily="34" charset="0"/>
-              <a:buChar char="•"/>
-            </a:pPr>
-            <a:r>
-              <a:rPr lang="en-US" sz="3600" dirty="0" smtClean="0"/>
-              <a:t>Ready to use GUI frameworks</a:t>
-            </a:r>
-          </a:p>
-          <a:p>
-            <a:pPr marL="457200" indent="-457200">
-              <a:buFont typeface="Arial" panose="020B0604020202020204" pitchFamily="34" charset="0"/>
-              <a:buChar char="•"/>
-            </a:pPr>
-            <a:r>
-              <a:rPr lang="en-US" dirty="0" smtClean="0">
-                <a:hlinkClick r:id="rId3"/>
-              </a:rPr>
-              <a:t>https://angular-ui.github.io/bootstrap/</a:t>
-            </a:r>
-            <a:endParaRPr lang="en-US" dirty="0" smtClean="0"/>
+            <a:r>
+              <a:rPr lang="en-US" dirty="0" smtClean="0"/>
+              <a:t>Sample Application</a:t>
+            </a:r>
+            <a:endParaRPr lang="en-US" dirty="0"/>
           </a:p>
         </p:txBody>
       </p:sp>
     </p:spTree>
-    <p:extLst>
-      <p:ext uri="{BB962C8B-B14F-4D97-AF65-F5344CB8AC3E}">
-        <p14:creationId xmlns="" xmlns:p14="http://schemas.microsoft.com/office/powerpoint/2010/main" val="3054112379"/>
-      </p:ext>
-    </p:extLst>
   </p:cSld>
   <p:clrMapOvr>
     <a:masterClrMapping/>
@@ -7776,172 +7222,46 @@
           </a:bodyPr>
           <a:lstStyle/>
           <a:p>
-            <a:pPr>
-              <a:buFont typeface="Arial" pitchFamily="34" charset="0"/>
-              <a:buChar char="•"/>
-            </a:pPr>
-            <a:r>
-              <a:rPr lang="en-US" dirty="0" smtClean="0"/>
-              <a:t>Simple page to display data (JSON) using</a:t>
+            <a:r>
+              <a:rPr lang="en-US" sz="3500" dirty="0" smtClean="0"/>
+              <a:t>Introduction to Bower</a:t>
             </a:r>
           </a:p>
           <a:p>
             <a:pPr lvl="1"/>
             <a:r>
-              <a:rPr lang="en-US" dirty="0" smtClean="0"/>
-              <a:t>View </a:t>
-            </a:r>
-            <a:r>
-              <a:rPr lang="en-US" dirty="0" smtClean="0"/>
-              <a:t>(html template)</a:t>
-            </a:r>
-          </a:p>
-          <a:p>
-            <a:pPr lvl="1"/>
-            <a:r>
-              <a:rPr lang="en-US" dirty="0" smtClean="0"/>
-              <a:t>Controller </a:t>
-            </a:r>
-            <a:r>
-              <a:rPr lang="en-US" dirty="0" smtClean="0"/>
-              <a:t>/ scope / Model </a:t>
-            </a:r>
-            <a:r>
-              <a:rPr lang="en-US" dirty="0" smtClean="0"/>
-              <a:t>/ Service</a:t>
-            </a:r>
-            <a:endParaRPr lang="en-US" dirty="0" smtClean="0"/>
-          </a:p>
-          <a:p>
-            <a:pPr marL="365760" lvl="1" indent="-256032">
-              <a:spcBef>
-                <a:spcPts val="400"/>
-              </a:spcBef>
-              <a:buSzPct val="68000"/>
-              <a:buFont typeface="Arial" pitchFamily="34" charset="0"/>
-              <a:buChar char="•"/>
-            </a:pPr>
-            <a:r>
-              <a:rPr lang="en-US" sz="2700" dirty="0" smtClean="0"/>
-              <a:t>Directory </a:t>
-            </a:r>
-            <a:r>
-              <a:rPr lang="en-US" sz="2700" dirty="0" smtClean="0"/>
-              <a:t>Structure</a:t>
-            </a:r>
-          </a:p>
-          <a:p>
-            <a:pPr lvl="2">
-              <a:buFont typeface="Arial" pitchFamily="34" charset="0"/>
-              <a:buChar char="•"/>
-            </a:pPr>
-            <a:r>
-              <a:rPr lang="en-US" dirty="0" smtClean="0"/>
-              <a:t>Index.html / Home.html  / About.html (View</a:t>
-            </a:r>
-            <a:r>
-              <a:rPr lang="en-US" dirty="0" smtClean="0"/>
-              <a:t>)</a:t>
-            </a:r>
-          </a:p>
-          <a:p>
-            <a:pPr lvl="2">
-              <a:buFont typeface="Arial" pitchFamily="34" charset="0"/>
-              <a:buChar char="•"/>
-            </a:pPr>
-            <a:r>
-              <a:rPr lang="en-US" dirty="0" smtClean="0"/>
-              <a:t>App.js (Model)</a:t>
-            </a:r>
-          </a:p>
-          <a:p>
-            <a:pPr lvl="2">
-              <a:buFont typeface="Arial" pitchFamily="34" charset="0"/>
-              <a:buChar char="•"/>
-            </a:pPr>
-            <a:r>
-              <a:rPr lang="en-US" dirty="0" smtClean="0"/>
-              <a:t>Controller.js </a:t>
-            </a:r>
-            <a:r>
-              <a:rPr lang="en-US" dirty="0" smtClean="0"/>
-              <a:t>(</a:t>
-            </a:r>
-            <a:r>
-              <a:rPr lang="en-US" dirty="0" smtClean="0"/>
-              <a:t>Controllers )</a:t>
-            </a:r>
-          </a:p>
-          <a:p>
-            <a:pPr lvl="2">
-              <a:buFont typeface="Arial" pitchFamily="34" charset="0"/>
-              <a:buChar char="•"/>
-            </a:pPr>
-            <a:r>
-              <a:rPr lang="en-US" dirty="0" smtClean="0"/>
-              <a:t>Filter.js </a:t>
-            </a:r>
-            <a:r>
-              <a:rPr lang="en-US" dirty="0" smtClean="0"/>
-              <a:t>(</a:t>
-            </a:r>
-            <a:r>
-              <a:rPr lang="en-US" dirty="0" err="1" smtClean="0"/>
-              <a:t>AngularJS</a:t>
-            </a:r>
-            <a:r>
-              <a:rPr lang="en-US" dirty="0" smtClean="0"/>
-              <a:t> specific to filter data using custom filter)</a:t>
-            </a:r>
-          </a:p>
-          <a:p>
-            <a:pPr lvl="2">
-              <a:buFont typeface="Arial" pitchFamily="34" charset="0"/>
-              <a:buChar char="•"/>
-            </a:pPr>
-            <a:r>
-              <a:rPr lang="en-US" dirty="0" err="1" smtClean="0"/>
-              <a:t>User.json</a:t>
-            </a:r>
-            <a:r>
-              <a:rPr lang="en-US" dirty="0" smtClean="0"/>
-              <a:t> (Data storage</a:t>
-            </a:r>
-            <a:r>
-              <a:rPr lang="en-US" dirty="0" smtClean="0"/>
-              <a:t>)</a:t>
-            </a:r>
-          </a:p>
-          <a:p>
-            <a:pPr lvl="2">
-              <a:buFont typeface="Arial" pitchFamily="34" charset="0"/>
-              <a:buChar char="•"/>
-            </a:pPr>
-            <a:r>
-              <a:rPr lang="en-US" dirty="0" smtClean="0"/>
-              <a:t>Services.js</a:t>
-            </a:r>
-            <a:endParaRPr lang="en-US" dirty="0" smtClean="0"/>
-          </a:p>
-          <a:p>
-            <a:pPr lvl="2">
-              <a:buFont typeface="Arial" pitchFamily="34" charset="0"/>
-              <a:buChar char="•"/>
-            </a:pPr>
-            <a:endParaRPr lang="en-US" dirty="0" smtClean="0"/>
-          </a:p>
-          <a:p>
-            <a:pPr lvl="1">
-              <a:buNone/>
-            </a:pPr>
-            <a:endParaRPr lang="en-US" dirty="0" smtClean="0"/>
-          </a:p>
-          <a:p>
-            <a:pPr lvl="1"/>
-            <a:endParaRPr lang="en-US" dirty="0" smtClean="0"/>
-          </a:p>
-          <a:p>
-            <a:endParaRPr lang="en-US" dirty="0"/>
+              <a:rPr lang="en-US" sz="3500" dirty="0" smtClean="0"/>
+              <a:t>Bower </a:t>
+            </a:r>
+            <a:r>
+              <a:rPr lang="en-US" sz="3500" dirty="0" smtClean="0"/>
+              <a:t>is a package </a:t>
+            </a:r>
+            <a:r>
+              <a:rPr lang="en-US" sz="3500" dirty="0" smtClean="0"/>
+              <a:t>manager to manage dependencies.</a:t>
+            </a:r>
+          </a:p>
+          <a:p>
+            <a:pPr lvl="2"/>
+            <a:r>
+              <a:rPr lang="en-US" sz="3500" dirty="0" smtClean="0"/>
+              <a:t>Index.html (no CDN)</a:t>
+            </a:r>
+          </a:p>
+          <a:p>
+            <a:pPr lvl="2"/>
+            <a:r>
+              <a:rPr lang="en-US" sz="3500" dirty="0" smtClean="0"/>
+              <a:t>bower.json (Git) </a:t>
+            </a:r>
+          </a:p>
+          <a:p>
+            <a:pPr lvl="2"/>
+            <a:endParaRPr lang="en-US" sz="3500" dirty="0" smtClean="0"/>
+          </a:p>
+          <a:p>
+            <a:endParaRPr lang="en-US" sz="3500" dirty="0" smtClean="0"/>
           </a:p>
         </p:txBody>
       </p:sp>
@@ -7962,7 +7282,7 @@
           <a:p>
             <a:r>
               <a:rPr lang="en-US" dirty="0" smtClean="0"/>
-              <a:t>Sample Application</a:t>
+              <a:t>Configuration Set up	</a:t>
             </a:r>
             <a:endParaRPr lang="en-US" dirty="0"/>
           </a:p>
@@ -8005,57 +7325,82 @@
         </p:nvSpPr>
         <p:spPr/>
         <p:txBody>
-          <a:bodyPr/>
+          <a:bodyPr>
+            <a:normAutofit/>
+          </a:bodyPr>
           <a:lstStyle/>
           <a:p>
             <a:r>
-              <a:rPr lang="en-US" dirty="0" err="1" smtClean="0"/>
-              <a:t>ngView</a:t>
-            </a:r>
+              <a:rPr lang="en-US" sz="3900" dirty="0" smtClean="0"/>
+              <a:t>ESRI Developer</a:t>
+            </a:r>
+          </a:p>
+          <a:p>
+            <a:pPr lvl="1"/>
+            <a:r>
+              <a:rPr lang="en-US" sz="3500" dirty="0" smtClean="0"/>
+              <a:t>DOJO </a:t>
+            </a:r>
+            <a:r>
+              <a:rPr lang="en-US" sz="3500" dirty="0" smtClean="0"/>
+              <a:t>AMD - loads dependencies</a:t>
+            </a:r>
+          </a:p>
+          <a:p>
+            <a:pPr lvl="1"/>
+            <a:r>
+              <a:rPr lang="en-US" sz="3500" dirty="0" smtClean="0"/>
+              <a:t>Show function call first and then function declared.</a:t>
+            </a:r>
+          </a:p>
+          <a:p>
+            <a:pPr lvl="1"/>
+            <a:r>
+              <a:rPr lang="en-US" sz="3500" dirty="0" smtClean="0"/>
+              <a:t>Dojo </a:t>
+            </a:r>
+            <a:r>
+              <a:rPr lang="en-US" sz="3500" smtClean="0"/>
+              <a:t>not that case.</a:t>
+            </a:r>
+            <a:endParaRPr lang="en-US" sz="3500" dirty="0" smtClean="0"/>
+          </a:p>
+          <a:p>
+            <a:r>
+              <a:rPr lang="en-US" sz="3900" dirty="0" smtClean="0"/>
+              <a:t>AngularJS</a:t>
+            </a:r>
+            <a:endParaRPr lang="en-US" sz="3900" dirty="0" smtClean="0"/>
+          </a:p>
+          <a:p>
+            <a:pPr lvl="1"/>
+            <a:r>
+              <a:rPr lang="en-US" sz="3500" dirty="0" smtClean="0"/>
+              <a:t>Requirejs</a:t>
+            </a:r>
+          </a:p>
+        </p:txBody>
+      </p:sp>
+      <p:sp>
+        <p:nvSpPr>
+          <p:cNvPr id="3" name="Title 2"/>
+          <p:cNvSpPr>
+            <a:spLocks noGrp="1"/>
+          </p:cNvSpPr>
+          <p:nvPr>
+            <p:ph type="title"/>
+          </p:nvPr>
+        </p:nvSpPr>
+        <p:spPr/>
+        <p:txBody>
+          <a:bodyPr>
+            <a:normAutofit/>
+          </a:bodyPr>
+          <a:lstStyle/>
+          <a:p>
             <a:r>
               <a:rPr lang="en-US" dirty="0" smtClean="0"/>
-              <a:t> is a directive that complements the </a:t>
-            </a:r>
-            <a:r>
-              <a:rPr lang="en-US" dirty="0" smtClean="0">
-                <a:hlinkClick r:id="rId2"/>
-              </a:rPr>
-              <a:t>$route</a:t>
-            </a:r>
-            <a:r>
-              <a:rPr lang="en-US" dirty="0" smtClean="0"/>
-              <a:t> service by including the rendered template of the current route into the main layout (index.html) file. Every time the current route changes, the included view changes with it according to the configuration of the $</a:t>
-            </a:r>
-            <a:r>
-              <a:rPr lang="en-US" dirty="0" err="1" smtClean="0"/>
-              <a:t>routeservice</a:t>
-            </a:r>
-            <a:r>
-              <a:rPr lang="en-US" dirty="0" smtClean="0"/>
-              <a:t>.</a:t>
-            </a:r>
-            <a:endParaRPr lang="en-US" dirty="0"/>
-          </a:p>
-        </p:txBody>
-      </p:sp>
-      <p:sp>
-        <p:nvSpPr>
-          <p:cNvPr id="3" name="Title 2"/>
-          <p:cNvSpPr>
-            <a:spLocks noGrp="1"/>
-          </p:cNvSpPr>
-          <p:nvPr>
-            <p:ph type="title"/>
-          </p:nvPr>
-        </p:nvSpPr>
-        <p:spPr/>
-        <p:txBody>
-          <a:bodyPr/>
-          <a:lstStyle/>
-          <a:p>
-            <a:r>
-              <a:rPr lang="en-US" dirty="0" smtClean="0"/>
-              <a:t>View</a:t>
+              <a:t>Angular Dependencies 	</a:t>
             </a:r>
             <a:endParaRPr lang="en-US" dirty="0"/>
           </a:p>
@@ -8098,68 +7443,63 @@
         </p:nvSpPr>
         <p:spPr/>
         <p:txBody>
+          <a:bodyPr>
+            <a:normAutofit/>
+          </a:bodyPr>
+          <a:lstStyle/>
+          <a:p>
+            <a:pPr marL="457200" indent="-457200">
+              <a:buFont typeface="Arial" panose="020B0604020202020204" pitchFamily="34" charset="0"/>
+              <a:buChar char="•"/>
+            </a:pPr>
+            <a:r>
+              <a:rPr lang="en-US" sz="3500" dirty="0" smtClean="0"/>
+              <a:t>RootScope </a:t>
+            </a:r>
+          </a:p>
+          <a:p>
+            <a:pPr marL="914400" lvl="1" indent="-457200">
+              <a:buFont typeface="Arial" panose="020B0604020202020204" pitchFamily="34" charset="0"/>
+              <a:buChar char="•"/>
+            </a:pPr>
+            <a:r>
+              <a:rPr lang="en-US" sz="3500" dirty="0" smtClean="0"/>
+              <a:t>Scopes provide separation between the model and the view, via a mechanism for watching the model for changes.</a:t>
+            </a:r>
+          </a:p>
+          <a:p>
+            <a:pPr marL="914400" lvl="1" indent="-457200">
+              <a:buFont typeface="Arial" panose="020B0604020202020204" pitchFamily="34" charset="0"/>
+              <a:buChar char="•"/>
+            </a:pPr>
+            <a:r>
+              <a:rPr lang="en-US" sz="3500" dirty="0" smtClean="0"/>
+              <a:t>Can also be used to communicate between controllers</a:t>
+            </a:r>
+          </a:p>
+          <a:p>
+            <a:endParaRPr lang="en-US" sz="3500" dirty="0"/>
+          </a:p>
+        </p:txBody>
+      </p:sp>
+      <p:sp>
+        <p:nvSpPr>
+          <p:cNvPr id="3" name="Title 2"/>
+          <p:cNvSpPr>
+            <a:spLocks noGrp="1"/>
+          </p:cNvSpPr>
+          <p:nvPr>
+            <p:ph type="title"/>
+          </p:nvPr>
+        </p:nvSpPr>
+        <p:spPr/>
+        <p:txBody>
           <a:bodyPr/>
           <a:lstStyle/>
           <a:p>
             <a:r>
-              <a:rPr lang="en-US" dirty="0" smtClean="0"/>
-              <a:t>The </a:t>
-            </a:r>
-            <a:r>
               <a:rPr lang="en-US" dirty="0" err="1" smtClean="0"/>
-              <a:t>ngRoute</a:t>
-            </a:r>
-            <a:r>
-              <a:rPr lang="en-US" dirty="0" smtClean="0"/>
-              <a:t> module provides routing and </a:t>
-            </a:r>
-            <a:r>
-              <a:rPr lang="en-US" dirty="0" err="1" smtClean="0"/>
-              <a:t>deeplinking</a:t>
-            </a:r>
-            <a:r>
-              <a:rPr lang="en-US" dirty="0" smtClean="0"/>
-              <a:t> services and directives for angular apps</a:t>
-            </a:r>
-            <a:r>
-              <a:rPr lang="en-US" dirty="0" smtClean="0"/>
-              <a:t>.</a:t>
-            </a:r>
-          </a:p>
-          <a:p>
-            <a:r>
-              <a:rPr lang="en-US" dirty="0" smtClean="0"/>
-              <a:t>Route service that injects html into </a:t>
-            </a:r>
-            <a:r>
-              <a:rPr lang="en-US" dirty="0" err="1" smtClean="0"/>
-              <a:t>ng</a:t>
-            </a:r>
-            <a:r>
-              <a:rPr lang="en-US" dirty="0" smtClean="0"/>
-              <a:t>-view</a:t>
-            </a:r>
-          </a:p>
-        </p:txBody>
-      </p:sp>
-      <p:sp>
-        <p:nvSpPr>
-          <p:cNvPr id="3" name="Title 2"/>
-          <p:cNvSpPr>
-            <a:spLocks noGrp="1"/>
-          </p:cNvSpPr>
-          <p:nvPr>
-            <p:ph type="title"/>
-          </p:nvPr>
-        </p:nvSpPr>
-        <p:spPr/>
-        <p:txBody>
-          <a:bodyPr/>
-          <a:lstStyle/>
-          <a:p>
-            <a:r>
-              <a:rPr lang="en-US" dirty="0" err="1" smtClean="0"/>
-              <a:t>ngRoute</a:t>
+              <a:t>Rootscope</a:t>
             </a:r>
             <a:endParaRPr lang="en-US" dirty="0"/>
           </a:p>
@@ -8192,180 +7532,157 @@
       </p:grpSpPr>
       <p:sp>
         <p:nvSpPr>
-          <p:cNvPr id="3" name="Subtitle 2"/>
-          <p:cNvSpPr>
-            <a:spLocks noGrp="1"/>
-          </p:cNvSpPr>
-          <p:nvPr>
-            <p:ph type="subTitle" idx="1"/>
+          <p:cNvPr id="2" name="Content Placeholder 1"/>
+          <p:cNvSpPr>
+            <a:spLocks noGrp="1"/>
+          </p:cNvSpPr>
+          <p:nvPr>
+            <p:ph idx="1"/>
+          </p:nvPr>
+        </p:nvSpPr>
+        <p:spPr/>
+        <p:txBody>
+          <a:bodyPr/>
+          <a:lstStyle/>
+          <a:p>
+            <a:r>
+              <a:rPr lang="en-US" dirty="0" smtClean="0"/>
+              <a:t>AngularJS directives are extended </a:t>
+            </a:r>
+            <a:r>
+              <a:rPr lang="en-US" b="1" dirty="0" smtClean="0"/>
+              <a:t>HTML</a:t>
+            </a:r>
+            <a:r>
+              <a:rPr lang="en-US" dirty="0" smtClean="0"/>
+              <a:t> attributes with the prefix </a:t>
+            </a:r>
+            <a:r>
+              <a:rPr lang="en-US" dirty="0" err="1" smtClean="0"/>
+              <a:t>ng</a:t>
+            </a:r>
+            <a:r>
+              <a:rPr lang="en-US" dirty="0" smtClean="0"/>
+              <a:t>- . </a:t>
+            </a:r>
+            <a:r>
+              <a:rPr lang="en-US" dirty="0" smtClean="0"/>
+              <a:t>The </a:t>
+            </a:r>
+            <a:r>
+              <a:rPr lang="en-US" dirty="0" err="1" smtClean="0"/>
+              <a:t>ng</a:t>
+            </a:r>
+            <a:r>
+              <a:rPr lang="en-US" dirty="0" smtClean="0"/>
+              <a:t>-app directive initializes an AngularJS application. The </a:t>
+            </a:r>
+            <a:r>
+              <a:rPr lang="en-US" b="1" dirty="0" err="1" smtClean="0"/>
+              <a:t>ng</a:t>
+            </a:r>
+            <a:r>
+              <a:rPr lang="en-US" b="1" dirty="0" smtClean="0"/>
+              <a:t>-model directive</a:t>
+            </a:r>
+            <a:r>
+              <a:rPr lang="en-US" dirty="0" smtClean="0"/>
+              <a:t> binds the value of </a:t>
+            </a:r>
+            <a:r>
+              <a:rPr lang="en-US" b="1" dirty="0" smtClean="0"/>
+              <a:t>HTML</a:t>
+            </a:r>
+            <a:r>
+              <a:rPr lang="en-US" dirty="0" smtClean="0"/>
+              <a:t> controls (input, select, </a:t>
+            </a:r>
+            <a:r>
+              <a:rPr lang="en-US" dirty="0" err="1" smtClean="0"/>
+              <a:t>textarea</a:t>
+            </a:r>
+            <a:r>
+              <a:rPr lang="en-US" dirty="0" smtClean="0"/>
+              <a:t>) to application </a:t>
+            </a:r>
+            <a:r>
+              <a:rPr lang="en-US" dirty="0" smtClean="0"/>
+              <a:t>data.</a:t>
+            </a:r>
+          </a:p>
+          <a:p>
+            <a:r>
+              <a:rPr lang="en-US" dirty="0" err="1" smtClean="0"/>
+              <a:t>custDirective</a:t>
+            </a:r>
+            <a:r>
+              <a:rPr lang="en-US" dirty="0" smtClean="0"/>
+              <a:t> Page</a:t>
+            </a:r>
+          </a:p>
+          <a:p>
+            <a:pPr lvl="1"/>
+            <a:r>
+              <a:rPr lang="en-US" dirty="0" smtClean="0"/>
+              <a:t>Directives.js</a:t>
+            </a:r>
+          </a:p>
+          <a:p>
+            <a:pPr lvl="1"/>
+            <a:r>
+              <a:rPr lang="en-US" dirty="0" smtClean="0"/>
+              <a:t>Directive makes easy for developers.</a:t>
+            </a:r>
+          </a:p>
+          <a:p>
+            <a:pPr lvl="2"/>
+            <a:r>
+              <a:rPr lang="en-US" dirty="0" smtClean="0"/>
+              <a:t>Example </a:t>
+            </a:r>
+            <a:r>
+              <a:rPr lang="en-US" dirty="0" err="1" smtClean="0"/>
+              <a:t>ng</a:t>
+            </a:r>
+            <a:r>
+              <a:rPr lang="en-US" dirty="0" smtClean="0"/>
+              <a:t>-if</a:t>
+            </a:r>
+          </a:p>
+          <a:p>
+            <a:endParaRPr lang="en-US" dirty="0" smtClean="0"/>
+          </a:p>
+        </p:txBody>
+      </p:sp>
+      <p:sp>
+        <p:nvSpPr>
+          <p:cNvPr id="3" name="Title 2"/>
+          <p:cNvSpPr>
+            <a:spLocks noGrp="1"/>
+          </p:cNvSpPr>
+          <p:nvPr>
+            <p:ph type="title"/>
           </p:nvPr>
         </p:nvSpPr>
         <p:spPr>
           <a:xfrm>
-            <a:off x="381000" y="381000"/>
-            <a:ext cx="8001000" cy="4953000"/>
+            <a:off x="457200" y="0"/>
+            <a:ext cx="8229600" cy="1143000"/>
           </a:xfrm>
         </p:spPr>
         <p:txBody>
-          <a:bodyPr>
-            <a:normAutofit/>
-          </a:bodyPr>
+          <a:bodyPr/>
           <a:lstStyle/>
           <a:p>
-            <a:pPr marL="457200" indent="-457200" algn="l"/>
-            <a:endParaRPr lang="en-US" dirty="0" smtClean="0"/>
-          </a:p>
-          <a:p>
-            <a:pPr marL="457200" indent="-457200" algn="l"/>
             <a:r>
               <a:rPr lang="en-US" dirty="0" smtClean="0"/>
-              <a:t>	</a:t>
-            </a:r>
-          </a:p>
-          <a:p>
-            <a:pPr marL="914400" lvl="1" indent="-457200" algn="l">
-              <a:buFont typeface="Arial" panose="020B0604020202020204" pitchFamily="34" charset="0"/>
-              <a:buChar char="•"/>
-            </a:pPr>
-            <a:r>
-              <a:rPr lang="en-US" dirty="0" smtClean="0"/>
-              <a:t>A </a:t>
-            </a:r>
-            <a:r>
-              <a:rPr lang="en-US" dirty="0"/>
-              <a:t>Controller is defined by a JavaScript </a:t>
-            </a:r>
-            <a:r>
-              <a:rPr lang="en-US" b="1" dirty="0"/>
-              <a:t>constructor function</a:t>
-            </a:r>
-            <a:r>
-              <a:rPr lang="en-US" dirty="0"/>
-              <a:t> that is used to augment the </a:t>
-            </a:r>
-            <a:r>
-              <a:rPr lang="en-US" dirty="0">
-                <a:hlinkClick r:id="rId3"/>
-              </a:rPr>
-              <a:t>Angular Scope</a:t>
-            </a:r>
-            <a:r>
-              <a:rPr lang="en-US" dirty="0" smtClean="0"/>
-              <a:t>.</a:t>
-            </a:r>
-            <a:r>
-              <a:rPr lang="en-US" b="1" dirty="0" smtClean="0">
-                <a:solidFill>
-                  <a:schemeClr val="tx2">
-                    <a:lumMod val="60000"/>
-                    <a:lumOff val="40000"/>
-                  </a:schemeClr>
-                </a:solidFill>
-              </a:rPr>
-              <a:t> </a:t>
-            </a:r>
-          </a:p>
-        </p:txBody>
-      </p:sp>
-      <p:sp>
-        <p:nvSpPr>
-          <p:cNvPr id="4" name="Title 2"/>
-          <p:cNvSpPr txBox="1">
-            <a:spLocks/>
-          </p:cNvSpPr>
-          <p:nvPr/>
-        </p:nvSpPr>
-        <p:spPr>
-          <a:xfrm>
-            <a:off x="457200" y="274638"/>
-            <a:ext cx="8229600" cy="944562"/>
-          </a:xfrm>
-          <a:prstGeom prst="rect">
-            <a:avLst/>
-          </a:prstGeom>
-        </p:spPr>
-        <p:txBody>
-          <a:bodyPr vert="horz" anchor="b">
-            <a:normAutofit/>
-            <a:scene3d>
-              <a:camera prst="orthographicFront"/>
-              <a:lightRig rig="soft" dir="t"/>
-            </a:scene3d>
-            <a:sp3d prstMaterial="softEdge">
-              <a:bevelT w="25400" h="25400"/>
-            </a:sp3d>
-          </a:bodyPr>
-          <a:lstStyle/>
-          <a:p>
-            <a:pPr marL="0" marR="0" lvl="0" indent="0" defTabSz="914400" rtl="0" eaLnBrk="1" fontAlgn="auto" latinLnBrk="0" hangingPunct="1">
-              <a:lnSpc>
-                <a:spcPct val="100000"/>
-              </a:lnSpc>
-              <a:spcBef>
-                <a:spcPct val="0"/>
-              </a:spcBef>
-              <a:spcAft>
-                <a:spcPts val="0"/>
-              </a:spcAft>
-              <a:buClrTx/>
-              <a:buSzTx/>
-              <a:buFontTx/>
-              <a:buNone/>
-              <a:tabLst/>
-              <a:defRPr/>
-            </a:pPr>
-            <a:r>
-              <a:rPr kumimoji="0" lang="en-US" sz="4100" b="1" i="0" u="none" strike="noStrike" kern="1200" cap="none" spc="0" normalizeH="0" baseline="0" noProof="0" dirty="0" smtClean="0">
-                <a:ln>
-                  <a:noFill/>
-                </a:ln>
-                <a:solidFill>
-                  <a:schemeClr val="tx2"/>
-                </a:solidFill>
-                <a:effectLst>
-                  <a:outerShdw blurRad="31750" dist="25400" dir="5400000" algn="tl" rotWithShape="0">
-                    <a:srgbClr val="000000">
-                      <a:alpha val="25000"/>
-                    </a:srgbClr>
-                  </a:outerShdw>
-                </a:effectLst>
-                <a:uLnTx/>
-                <a:uFillTx/>
-                <a:latin typeface="+mj-lt"/>
-                <a:ea typeface="+mj-ea"/>
-                <a:cs typeface="+mj-cs"/>
-              </a:rPr>
-              <a:t>Controller</a:t>
-            </a:r>
-            <a:endParaRPr kumimoji="0" lang="en-US" sz="4100" b="1" i="0" u="none" strike="noStrike" kern="1200" cap="none" spc="0" normalizeH="0" baseline="0" noProof="0" dirty="0">
-              <a:ln>
-                <a:noFill/>
-              </a:ln>
-              <a:solidFill>
-                <a:schemeClr val="tx2"/>
-              </a:solidFill>
-              <a:effectLst>
-                <a:outerShdw blurRad="31750" dist="25400" dir="5400000" algn="tl" rotWithShape="0">
-                  <a:srgbClr val="000000">
-                    <a:alpha val="25000"/>
-                  </a:srgbClr>
-                </a:outerShdw>
-              </a:effectLst>
-              <a:uLnTx/>
-              <a:uFillTx/>
-              <a:latin typeface="+mj-lt"/>
-              <a:ea typeface="+mj-ea"/>
-              <a:cs typeface="+mj-cs"/>
-            </a:endParaRPr>
+              <a:t>Custom Directives</a:t>
+            </a:r>
+            <a:endParaRPr lang="en-US" dirty="0"/>
           </a:p>
         </p:txBody>
       </p:sp>
     </p:spTree>
-    <p:extLst>
-      <p:ext uri="{BB962C8B-B14F-4D97-AF65-F5344CB8AC3E}">
-        <p14:creationId xmlns="" xmlns:p14="http://schemas.microsoft.com/office/powerpoint/2010/main" val="3054112379"/>
-      </p:ext>
-    </p:extLst>
   </p:cSld>
   <p:clrMapOvr>
     <a:masterClrMapping/>
@@ -8407,27 +7724,24 @@
           </a:bodyPr>
           <a:lstStyle/>
           <a:p>
-            <a:pPr marL="457200" indent="-457200">
-              <a:buFont typeface="Arial" panose="020B0604020202020204" pitchFamily="34" charset="0"/>
-              <a:buChar char="•"/>
-            </a:pPr>
-            <a:r>
-              <a:rPr lang="en-US" dirty="0" smtClean="0"/>
-              <a:t>Scope </a:t>
-            </a:r>
-          </a:p>
-          <a:p>
-            <a:pPr marL="914400" lvl="1" indent="-457200">
-              <a:buFont typeface="Arial" panose="020B0604020202020204" pitchFamily="34" charset="0"/>
-              <a:buChar char="•"/>
-            </a:pPr>
-            <a:r>
-              <a:rPr lang="en-US" dirty="0" smtClean="0"/>
-              <a:t>Scope glue between application controller and the view.</a:t>
-            </a:r>
-          </a:p>
-          <a:p>
-            <a:endParaRPr lang="en-US" dirty="0"/>
+            <a:r>
+              <a:rPr lang="en-US" sz="3500" dirty="0" smtClean="0"/>
+              <a:t>D3 Charting Library for Interactive Charts</a:t>
+            </a:r>
+          </a:p>
+          <a:p>
+            <a:r>
+              <a:rPr lang="en-US" sz="3500" dirty="0" smtClean="0"/>
+              <a:t>Integrated with Angular.</a:t>
+            </a:r>
+          </a:p>
+          <a:p>
+            <a:pPr lvl="1"/>
+            <a:r>
+              <a:rPr lang="en-US" sz="3500" dirty="0" smtClean="0"/>
+              <a:t>nvd3Chart page</a:t>
+            </a:r>
+            <a:endParaRPr lang="en-US" sz="3500" dirty="0" smtClean="0"/>
           </a:p>
         </p:txBody>
       </p:sp>
@@ -8441,14 +7755,19 @@
             <p:ph type="title"/>
           </p:nvPr>
         </p:nvSpPr>
-        <p:spPr/>
+        <p:spPr>
+          <a:xfrm>
+            <a:off x="457200" y="0"/>
+            <a:ext cx="8229600" cy="1143000"/>
+          </a:xfrm>
+        </p:spPr>
         <p:txBody>
           <a:bodyPr/>
           <a:lstStyle/>
           <a:p>
             <a:r>
               <a:rPr lang="en-US" dirty="0" smtClean="0"/>
-              <a:t>Scope</a:t>
+              <a:t>D3 / NVD3</a:t>
             </a:r>
             <a:endParaRPr lang="en-US" dirty="0"/>
           </a:p>

</xml_diff>